<commit_message>
Avaliação disciplina Estrutura de Dados
</commit_message>
<xml_diff>
--- a/01_Estrutura_Dados/01_AVALIACAO_ESTRUTURA_DADOS_MBA_ENGENHARIA_DADOS.pptx
+++ b/01_Estrutura_Dados/01_AVALIACAO_ESTRUTURA_DADOS_MBA_ENGENHARIA_DADOS.pptx
@@ -4801,7 +4801,7 @@
                 </a:solidFill>
                 <a:latin typeface="Impact" panose="020B0806030902050204" pitchFamily="34" charset="0"/>
               </a:rPr>
-              <a:t>1.1 – Criar uma lista com pelo menos 10 elementos;</a:t>
+              <a:t>1.1 – Criar uma lista com pelo menos 10 elementos.</a:t>
             </a:r>
           </a:p>
           <a:p>
@@ -4812,7 +4812,7 @@
                 </a:solidFill>
                 <a:latin typeface="Impact" panose="020B0806030902050204" pitchFamily="34" charset="0"/>
               </a:rPr>
-              <a:t>1.2 – Adicionar 2 elementos nessa lista;</a:t>
+              <a:t>1.2 – Adicionar 2 elementos a essa lista.</a:t>
             </a:r>
           </a:p>
           <a:p>
@@ -4823,7 +4823,7 @@
                 </a:solidFill>
                 <a:latin typeface="Impact" panose="020B0806030902050204" pitchFamily="34" charset="0"/>
               </a:rPr>
-              <a:t>1.3 – Ordenar a lista;</a:t>
+              <a:t>1.3 – Ordenar a lista.</a:t>
             </a:r>
           </a:p>
           <a:p>
@@ -4834,7 +4834,7 @@
                 </a:solidFill>
                 <a:latin typeface="Impact" panose="020B0806030902050204" pitchFamily="34" charset="0"/>
               </a:rPr>
-              <a:t>1.4 – Eliminar 3 elementos da lista;</a:t>
+              <a:t>1.4 – Remover 3 elementos da lista.</a:t>
             </a:r>
           </a:p>
           <a:p>
@@ -4845,7 +4845,7 @@
                 </a:solidFill>
                 <a:latin typeface="Impact" panose="020B0806030902050204" pitchFamily="34" charset="0"/>
               </a:rPr>
-              <a:t>1.5 – Limpar a listar.</a:t>
+              <a:t>1.5 – Limpar a lista.</a:t>
             </a:r>
           </a:p>
         </p:txBody>
@@ -5732,7 +5732,7 @@
                 </a:solidFill>
                 <a:latin typeface="Impact" panose="020B0806030902050204" pitchFamily="34" charset="0"/>
               </a:rPr>
-              <a:t>2.1 – Criar um dicionário que permita identificar o nome do aluno, sua idade, data de nascimento e escolaridade. Esse dicionário deve conter pelo menos 8 elementos;</a:t>
+              <a:t>2.1 – Criar um dicionário que armazene o nome do aluno, sua idade, data de nascimento e escolaridade. Esse dicionário deve conter pelo menos 8 elementos.</a:t>
             </a:r>
           </a:p>
           <a:p>
@@ -5743,7 +5743,7 @@
                 </a:solidFill>
                 <a:latin typeface="Impact" panose="020B0806030902050204" pitchFamily="34" charset="0"/>
               </a:rPr>
-              <a:t>2.2 – Adicionar 2 elementos nesse dicionário; </a:t>
+              <a:t>2.2 – Adicionar 2 elementos a esse dicionário.</a:t>
             </a:r>
           </a:p>
           <a:p>
@@ -5754,7 +5754,7 @@
                 </a:solidFill>
                 <a:latin typeface="Impact" panose="020B0806030902050204" pitchFamily="34" charset="0"/>
               </a:rPr>
-              <a:t>2.4 – Eliminar 3 elementos do dicionário;</a:t>
+              <a:t>2.3 – Remover 3 elementos do dicionário.</a:t>
             </a:r>
           </a:p>
           <a:p>
@@ -5765,7 +5765,7 @@
                 </a:solidFill>
                 <a:latin typeface="Impact" panose="020B0806030902050204" pitchFamily="34" charset="0"/>
               </a:rPr>
-              <a:t>2.5 – Limpar o dicionário.</a:t>
+              <a:t>2.4 – Limpar o dicionário.</a:t>
             </a:r>
           </a:p>
         </p:txBody>
@@ -6612,8 +6612,8 @@
         </p:nvSpPr>
         <p:spPr>
           <a:xfrm>
-            <a:off x="355104" y="1700370"/>
-            <a:ext cx="11425561" cy="4616648"/>
+            <a:off x="355104" y="1552591"/>
+            <a:ext cx="11425561" cy="5078313"/>
           </a:xfrm>
           <a:prstGeom prst="rect">
             <a:avLst/>
@@ -6633,7 +6633,18 @@
                 </a:solidFill>
                 <a:latin typeface="Impact" panose="020B0806030902050204" pitchFamily="34" charset="0"/>
               </a:rPr>
-              <a:t>Para essa atividade será necessário realizar o download do arquivo </a:t>
+              <a:t>Para essa atividade será necessário realizar o download do arquivo:</a:t>
+            </a:r>
+          </a:p>
+          <a:p>
+            <a:r>
+              <a:rPr lang="pt-BR" sz="2400" dirty="0">
+                <a:solidFill>
+                  <a:srgbClr val="007DA9"/>
+                </a:solidFill>
+                <a:latin typeface="Impact" panose="020B0806030902050204" pitchFamily="34" charset="0"/>
+              </a:rPr>
+              <a:t> </a:t>
             </a:r>
             <a:r>
               <a:rPr lang="pt-BR" dirty="0">
@@ -6716,7 +6727,7 @@
                 </a:solidFill>
                 <a:latin typeface="Impact" panose="020B0806030902050204" pitchFamily="34" charset="0"/>
               </a:rPr>
-              <a:t>Após realizar o download, descompactar todos os 3 zips em um mesmo diretório.</a:t>
+              <a:t>Após realizar o download, descompacte todos os 3 arquivos zip em um mesmo diretório.</a:t>
             </a:r>
           </a:p>
           <a:p>
@@ -6754,7 +6765,7 @@
                 </a:solidFill>
                 <a:latin typeface="Impact" panose="020B0806030902050204" pitchFamily="34" charset="0"/>
               </a:rPr>
-              <a:t>3.1 – Criar uma rotina que leia o diretório onde estão os arquivos descompactados gerando uma lista. Após isso, separar os arquivos em diretórios de cada estado. O diretório de cada estado pode ser criado na mão ou pela própria rotina.</a:t>
+              <a:t>3.1 – Criar uma rotina que leia o diretório onde estão os arquivos descompactados, gerando uma lista. Em seguida, separar os arquivos em diretórios específicos para cada estado. Os diretórios de cada estado podem ser criados manualmente ou pela própria rotina.</a:t>
             </a:r>
           </a:p>
         </p:txBody>

</xml_diff>